<commit_message>
start slides: Added a note about sponsors
</commit_message>
<xml_diff>
--- a/start-slides.pptx
+++ b/start-slides.pptx
@@ -8,6 +8,7 @@
     <p:sldId id="256" r:id="rId2"/>
     <p:sldId id="257" r:id="rId3"/>
     <p:sldId id="258" r:id="rId4"/>
+    <p:sldId id="259" r:id="rId5"/>
   </p:sldIdLst>
   <p:sldSz cx="12192000" cy="6858000"/>
   <p:notesSz cx="6858000" cy="9144000"/>
@@ -263,7 +264,7 @@
           <a:p>
             <a:fld id="{4A52D4BF-0EB6-E047-81FF-0C2CAFE5DE32}" type="datetimeFigureOut">
               <a:rPr lang="en-CH" smtClean="0"/>
-              <a:t>08/09/2022</a:t>
+              <a:t>10.08.22</a:t>
             </a:fld>
             <a:endParaRPr lang="en-CH"/>
           </a:p>
@@ -317,7 +318,7 @@
           <a:p>
             <a:fld id="{B0EF2F08-E45E-1A41-8309-F6039F0DB567}" type="slidenum">
               <a:rPr lang="en-CH" smtClean="0"/>
-              <a:t>‹N°›</a:t>
+              <a:t>‹#›</a:t>
             </a:fld>
             <a:endParaRPr lang="en-CH"/>
           </a:p>
@@ -463,7 +464,7 @@
           <a:p>
             <a:fld id="{4A52D4BF-0EB6-E047-81FF-0C2CAFE5DE32}" type="datetimeFigureOut">
               <a:rPr lang="en-CH" smtClean="0"/>
-              <a:t>08/09/2022</a:t>
+              <a:t>10.08.22</a:t>
             </a:fld>
             <a:endParaRPr lang="en-CH"/>
           </a:p>
@@ -517,7 +518,7 @@
           <a:p>
             <a:fld id="{B0EF2F08-E45E-1A41-8309-F6039F0DB567}" type="slidenum">
               <a:rPr lang="en-CH" smtClean="0"/>
-              <a:t>‹N°›</a:t>
+              <a:t>‹#›</a:t>
             </a:fld>
             <a:endParaRPr lang="en-CH"/>
           </a:p>
@@ -673,7 +674,7 @@
           <a:p>
             <a:fld id="{4A52D4BF-0EB6-E047-81FF-0C2CAFE5DE32}" type="datetimeFigureOut">
               <a:rPr lang="en-CH" smtClean="0"/>
-              <a:t>08/09/2022</a:t>
+              <a:t>10.08.22</a:t>
             </a:fld>
             <a:endParaRPr lang="en-CH"/>
           </a:p>
@@ -727,7 +728,7 @@
           <a:p>
             <a:fld id="{B0EF2F08-E45E-1A41-8309-F6039F0DB567}" type="slidenum">
               <a:rPr lang="en-CH" smtClean="0"/>
-              <a:t>‹N°›</a:t>
+              <a:t>‹#›</a:t>
             </a:fld>
             <a:endParaRPr lang="en-CH"/>
           </a:p>
@@ -873,7 +874,7 @@
           <a:p>
             <a:fld id="{4A52D4BF-0EB6-E047-81FF-0C2CAFE5DE32}" type="datetimeFigureOut">
               <a:rPr lang="en-CH" smtClean="0"/>
-              <a:t>08/09/2022</a:t>
+              <a:t>10.08.22</a:t>
             </a:fld>
             <a:endParaRPr lang="en-CH"/>
           </a:p>
@@ -927,7 +928,7 @@
           <a:p>
             <a:fld id="{B0EF2F08-E45E-1A41-8309-F6039F0DB567}" type="slidenum">
               <a:rPr lang="en-CH" smtClean="0"/>
-              <a:t>‹N°›</a:t>
+              <a:t>‹#›</a:t>
             </a:fld>
             <a:endParaRPr lang="en-CH"/>
           </a:p>
@@ -1149,7 +1150,7 @@
           <a:p>
             <a:fld id="{4A52D4BF-0EB6-E047-81FF-0C2CAFE5DE32}" type="datetimeFigureOut">
               <a:rPr lang="en-CH" smtClean="0"/>
-              <a:t>08/09/2022</a:t>
+              <a:t>10.08.22</a:t>
             </a:fld>
             <a:endParaRPr lang="en-CH"/>
           </a:p>
@@ -1203,7 +1204,7 @@
           <a:p>
             <a:fld id="{B0EF2F08-E45E-1A41-8309-F6039F0DB567}" type="slidenum">
               <a:rPr lang="en-CH" smtClean="0"/>
-              <a:t>‹N°›</a:t>
+              <a:t>‹#›</a:t>
             </a:fld>
             <a:endParaRPr lang="en-CH"/>
           </a:p>
@@ -1417,7 +1418,7 @@
           <a:p>
             <a:fld id="{4A52D4BF-0EB6-E047-81FF-0C2CAFE5DE32}" type="datetimeFigureOut">
               <a:rPr lang="en-CH" smtClean="0"/>
-              <a:t>08/09/2022</a:t>
+              <a:t>10.08.22</a:t>
             </a:fld>
             <a:endParaRPr lang="en-CH"/>
           </a:p>
@@ -1471,7 +1472,7 @@
           <a:p>
             <a:fld id="{B0EF2F08-E45E-1A41-8309-F6039F0DB567}" type="slidenum">
               <a:rPr lang="en-CH" smtClean="0"/>
-              <a:t>‹N°›</a:t>
+              <a:t>‹#›</a:t>
             </a:fld>
             <a:endParaRPr lang="en-CH"/>
           </a:p>
@@ -1832,7 +1833,7 @@
           <a:p>
             <a:fld id="{4A52D4BF-0EB6-E047-81FF-0C2CAFE5DE32}" type="datetimeFigureOut">
               <a:rPr lang="en-CH" smtClean="0"/>
-              <a:t>08/09/2022</a:t>
+              <a:t>10.08.22</a:t>
             </a:fld>
             <a:endParaRPr lang="en-CH"/>
           </a:p>
@@ -1886,7 +1887,7 @@
           <a:p>
             <a:fld id="{B0EF2F08-E45E-1A41-8309-F6039F0DB567}" type="slidenum">
               <a:rPr lang="en-CH" smtClean="0"/>
-              <a:t>‹N°›</a:t>
+              <a:t>‹#›</a:t>
             </a:fld>
             <a:endParaRPr lang="en-CH"/>
           </a:p>
@@ -1974,7 +1975,7 @@
           <a:p>
             <a:fld id="{4A52D4BF-0EB6-E047-81FF-0C2CAFE5DE32}" type="datetimeFigureOut">
               <a:rPr lang="en-CH" smtClean="0"/>
-              <a:t>08/09/2022</a:t>
+              <a:t>10.08.22</a:t>
             </a:fld>
             <a:endParaRPr lang="en-CH"/>
           </a:p>
@@ -2028,7 +2029,7 @@
           <a:p>
             <a:fld id="{B0EF2F08-E45E-1A41-8309-F6039F0DB567}" type="slidenum">
               <a:rPr lang="en-CH" smtClean="0"/>
-              <a:t>‹N°›</a:t>
+              <a:t>‹#›</a:t>
             </a:fld>
             <a:endParaRPr lang="en-CH"/>
           </a:p>
@@ -2087,7 +2088,7 @@
           <a:p>
             <a:fld id="{4A52D4BF-0EB6-E047-81FF-0C2CAFE5DE32}" type="datetimeFigureOut">
               <a:rPr lang="en-CH" smtClean="0"/>
-              <a:t>08/09/2022</a:t>
+              <a:t>10.08.22</a:t>
             </a:fld>
             <a:endParaRPr lang="en-CH"/>
           </a:p>
@@ -2141,7 +2142,7 @@
           <a:p>
             <a:fld id="{B0EF2F08-E45E-1A41-8309-F6039F0DB567}" type="slidenum">
               <a:rPr lang="en-CH" smtClean="0"/>
-              <a:t>‹N°›</a:t>
+              <a:t>‹#›</a:t>
             </a:fld>
             <a:endParaRPr lang="en-CH"/>
           </a:p>
@@ -2400,7 +2401,7 @@
           <a:p>
             <a:fld id="{4A52D4BF-0EB6-E047-81FF-0C2CAFE5DE32}" type="datetimeFigureOut">
               <a:rPr lang="en-CH" smtClean="0"/>
-              <a:t>08/09/2022</a:t>
+              <a:t>10.08.22</a:t>
             </a:fld>
             <a:endParaRPr lang="en-CH"/>
           </a:p>
@@ -2454,7 +2455,7 @@
           <a:p>
             <a:fld id="{B0EF2F08-E45E-1A41-8309-F6039F0DB567}" type="slidenum">
               <a:rPr lang="en-CH" smtClean="0"/>
-              <a:t>‹N°›</a:t>
+              <a:t>‹#›</a:t>
             </a:fld>
             <a:endParaRPr lang="en-CH"/>
           </a:p>
@@ -2689,7 +2690,7 @@
           <a:p>
             <a:fld id="{4A52D4BF-0EB6-E047-81FF-0C2CAFE5DE32}" type="datetimeFigureOut">
               <a:rPr lang="en-CH" smtClean="0"/>
-              <a:t>08/09/2022</a:t>
+              <a:t>10.08.22</a:t>
             </a:fld>
             <a:endParaRPr lang="en-CH"/>
           </a:p>
@@ -2743,7 +2744,7 @@
           <a:p>
             <a:fld id="{B0EF2F08-E45E-1A41-8309-F6039F0DB567}" type="slidenum">
               <a:rPr lang="en-CH" smtClean="0"/>
-              <a:t>‹N°›</a:t>
+              <a:t>‹#›</a:t>
             </a:fld>
             <a:endParaRPr lang="en-CH"/>
           </a:p>
@@ -2932,7 +2933,7 @@
           <a:p>
             <a:fld id="{4A52D4BF-0EB6-E047-81FF-0C2CAFE5DE32}" type="datetimeFigureOut">
               <a:rPr lang="en-CH" smtClean="0"/>
-              <a:t>08/09/2022</a:t>
+              <a:t>10.08.22</a:t>
             </a:fld>
             <a:endParaRPr lang="en-CH"/>
           </a:p>
@@ -3022,7 +3023,7 @@
           <a:p>
             <a:fld id="{B0EF2F08-E45E-1A41-8309-F6039F0DB567}" type="slidenum">
               <a:rPr lang="en-CH" smtClean="0"/>
-              <a:t>‹N°›</a:t>
+              <a:t>‹#›</a:t>
             </a:fld>
             <a:endParaRPr lang="en-CH"/>
           </a:p>
@@ -4406,6 +4407,343 @@
 </p:sld>
 </file>
 
+<file path=ppt/slides/slide4.xml><?xml version="1.0" encoding="utf-8"?>
+<p:sld xmlns:a="http://schemas.openxmlformats.org/drawingml/2006/main" xmlns:r="http://schemas.openxmlformats.org/officeDocument/2006/relationships" xmlns:p="http://schemas.openxmlformats.org/presentationml/2006/main">
+  <p:cSld>
+    <p:spTree>
+      <p:nvGrpSpPr>
+        <p:cNvPr id="1" name=""/>
+        <p:cNvGrpSpPr/>
+        <p:nvPr/>
+      </p:nvGrpSpPr>
+      <p:grpSpPr>
+        <a:xfrm>
+          <a:off x="0" y="0"/>
+          <a:ext cx="0" cy="0"/>
+          <a:chOff x="0" y="0"/>
+          <a:chExt cx="0" cy="0"/>
+        </a:xfrm>
+      </p:grpSpPr>
+      <p:sp>
+        <p:nvSpPr>
+          <p:cNvPr id="2" name="Title 1">
+            <a:extLst>
+              <a:ext uri="{FF2B5EF4-FFF2-40B4-BE49-F238E27FC236}">
+                <a16:creationId xmlns:a16="http://schemas.microsoft.com/office/drawing/2014/main" id="{F75000D9-C06E-095A-A90B-21A6BF1B6B69}"/>
+              </a:ext>
+            </a:extLst>
+          </p:cNvPr>
+          <p:cNvSpPr>
+            <a:spLocks noGrp="1"/>
+          </p:cNvSpPr>
+          <p:nvPr>
+            <p:ph type="title"/>
+          </p:nvPr>
+        </p:nvSpPr>
+        <p:spPr/>
+        <p:txBody>
+          <a:bodyPr/>
+          <a:lstStyle/>
+          <a:p>
+            <a:r>
+              <a:rPr lang="en-CH" dirty="0"/>
+              <a:t>Sponsors</a:t>
+            </a:r>
+          </a:p>
+        </p:txBody>
+      </p:sp>
+      <p:pic>
+        <p:nvPicPr>
+          <p:cNvPr id="4" name="Picture 6">
+            <a:extLst>
+              <a:ext uri="{FF2B5EF4-FFF2-40B4-BE49-F238E27FC236}">
+                <a16:creationId xmlns:a16="http://schemas.microsoft.com/office/drawing/2014/main" id="{A04935DA-CE58-655B-4B0F-CFCB73838C8D}"/>
+              </a:ext>
+            </a:extLst>
+          </p:cNvPr>
+          <p:cNvPicPr>
+            <a:picLocks noChangeAspect="1" noChangeArrowheads="1"/>
+          </p:cNvPicPr>
+          <p:nvPr/>
+        </p:nvPicPr>
+        <p:blipFill>
+          <a:blip r:embed="rId2">
+            <a:extLst>
+              <a:ext uri="{28A0092B-C50C-407E-A947-70E740481C1C}">
+                <a14:useLocalDpi xmlns:a14="http://schemas.microsoft.com/office/drawing/2010/main" val="0"/>
+              </a:ext>
+            </a:extLst>
+          </a:blip>
+          <a:srcRect/>
+          <a:stretch>
+            <a:fillRect/>
+          </a:stretch>
+        </p:blipFill>
+        <p:spPr bwMode="auto">
+          <a:xfrm>
+            <a:off x="4072238" y="1808008"/>
+            <a:ext cx="1625600" cy="698500"/>
+          </a:xfrm>
+          <a:prstGeom prst="rect">
+            <a:avLst/>
+          </a:prstGeom>
+          <a:noFill/>
+          <a:extLst>
+            <a:ext uri="{909E8E84-426E-40DD-AFC4-6F175D3DCCD1}">
+              <a14:hiddenFill xmlns:a14="http://schemas.microsoft.com/office/drawing/2010/main">
+                <a:solidFill>
+                  <a:srgbClr val="FFFFFF"/>
+                </a:solidFill>
+              </a14:hiddenFill>
+            </a:ext>
+          </a:extLst>
+        </p:spPr>
+      </p:pic>
+      <p:pic>
+        <p:nvPicPr>
+          <p:cNvPr id="5" name="Picture 8">
+            <a:extLst>
+              <a:ext uri="{FF2B5EF4-FFF2-40B4-BE49-F238E27FC236}">
+                <a16:creationId xmlns:a16="http://schemas.microsoft.com/office/drawing/2014/main" id="{550F1EEE-6D48-23C1-AFA5-452ECB6A4E30}"/>
+              </a:ext>
+            </a:extLst>
+          </p:cNvPr>
+          <p:cNvPicPr>
+            <a:picLocks noChangeAspect="1" noChangeArrowheads="1"/>
+          </p:cNvPicPr>
+          <p:nvPr/>
+        </p:nvPicPr>
+        <p:blipFill>
+          <a:blip r:embed="rId3">
+            <a:extLst>
+              <a:ext uri="{28A0092B-C50C-407E-A947-70E740481C1C}">
+                <a14:useLocalDpi xmlns:a14="http://schemas.microsoft.com/office/drawing/2010/main" val="0"/>
+              </a:ext>
+            </a:extLst>
+          </a:blip>
+          <a:srcRect/>
+          <a:stretch>
+            <a:fillRect/>
+          </a:stretch>
+        </p:blipFill>
+        <p:spPr bwMode="auto">
+          <a:xfrm>
+            <a:off x="6035761" y="1697498"/>
+            <a:ext cx="2499841" cy="809010"/>
+          </a:xfrm>
+          <a:prstGeom prst="rect">
+            <a:avLst/>
+          </a:prstGeom>
+          <a:noFill/>
+          <a:extLst>
+            <a:ext uri="{909E8E84-426E-40DD-AFC4-6F175D3DCCD1}">
+              <a14:hiddenFill xmlns:a14="http://schemas.microsoft.com/office/drawing/2010/main">
+                <a:solidFill>
+                  <a:srgbClr val="FFFFFF"/>
+                </a:solidFill>
+              </a14:hiddenFill>
+            </a:ext>
+          </a:extLst>
+        </p:spPr>
+      </p:pic>
+      <p:pic>
+        <p:nvPicPr>
+          <p:cNvPr id="6" name="Graphic 5">
+            <a:extLst>
+              <a:ext uri="{FF2B5EF4-FFF2-40B4-BE49-F238E27FC236}">
+                <a16:creationId xmlns:a16="http://schemas.microsoft.com/office/drawing/2014/main" id="{FF150D7D-314A-415E-B468-A6BA45A668F1}"/>
+              </a:ext>
+            </a:extLst>
+          </p:cNvPr>
+          <p:cNvPicPr>
+            <a:picLocks noChangeAspect="1"/>
+          </p:cNvPicPr>
+          <p:nvPr/>
+        </p:nvPicPr>
+        <p:blipFill>
+          <a:blip r:embed="rId4">
+            <a:extLst>
+              <a:ext uri="{96DAC541-7B7A-43D3-8B79-37D633B846F1}">
+                <asvg:svgBlip xmlns:asvg="http://schemas.microsoft.com/office/drawing/2016/SVG/main" r:embed="rId5"/>
+              </a:ext>
+            </a:extLst>
+          </a:blip>
+          <a:stretch>
+            <a:fillRect/>
+          </a:stretch>
+        </p:blipFill>
+        <p:spPr>
+          <a:xfrm>
+            <a:off x="8873525" y="1886103"/>
+            <a:ext cx="2499841" cy="542309"/>
+          </a:xfrm>
+          <a:prstGeom prst="rect">
+            <a:avLst/>
+          </a:prstGeom>
+        </p:spPr>
+      </p:pic>
+      <p:pic>
+        <p:nvPicPr>
+          <p:cNvPr id="7" name="Picture 4">
+            <a:extLst>
+              <a:ext uri="{FF2B5EF4-FFF2-40B4-BE49-F238E27FC236}">
+                <a16:creationId xmlns:a16="http://schemas.microsoft.com/office/drawing/2014/main" id="{9A70B04A-000F-1AEE-9D13-07A626BB8DD7}"/>
+              </a:ext>
+            </a:extLst>
+          </p:cNvPr>
+          <p:cNvPicPr>
+            <a:picLocks noChangeAspect="1" noChangeArrowheads="1"/>
+          </p:cNvPicPr>
+          <p:nvPr/>
+        </p:nvPicPr>
+        <p:blipFill>
+          <a:blip r:embed="rId6">
+            <a:extLst>
+              <a:ext uri="{28A0092B-C50C-407E-A947-70E740481C1C}">
+                <a14:useLocalDpi xmlns:a14="http://schemas.microsoft.com/office/drawing/2010/main" val="0"/>
+              </a:ext>
+            </a:extLst>
+          </a:blip>
+          <a:srcRect/>
+          <a:stretch>
+            <a:fillRect/>
+          </a:stretch>
+        </p:blipFill>
+        <p:spPr bwMode="auto">
+          <a:xfrm>
+            <a:off x="1524000" y="1503208"/>
+            <a:ext cx="2451100" cy="1308100"/>
+          </a:xfrm>
+          <a:prstGeom prst="rect">
+            <a:avLst/>
+          </a:prstGeom>
+          <a:noFill/>
+          <a:extLst>
+            <a:ext uri="{909E8E84-426E-40DD-AFC4-6F175D3DCCD1}">
+              <a14:hiddenFill xmlns:a14="http://schemas.microsoft.com/office/drawing/2010/main">
+                <a:solidFill>
+                  <a:srgbClr val="FFFFFF"/>
+                </a:solidFill>
+              </a14:hiddenFill>
+            </a:ext>
+          </a:extLst>
+        </p:spPr>
+      </p:pic>
+      <p:sp>
+        <p:nvSpPr>
+          <p:cNvPr id="9" name="TextBox 8">
+            <a:extLst>
+              <a:ext uri="{FF2B5EF4-FFF2-40B4-BE49-F238E27FC236}">
+                <a16:creationId xmlns:a16="http://schemas.microsoft.com/office/drawing/2014/main" id="{2198F622-3E28-99EB-8081-6783E8612646}"/>
+              </a:ext>
+            </a:extLst>
+          </p:cNvPr>
+          <p:cNvSpPr txBox="1"/>
+          <p:nvPr/>
+        </p:nvSpPr>
+        <p:spPr>
+          <a:xfrm>
+            <a:off x="3048000" y="3661691"/>
+            <a:ext cx="6096000" cy="369332"/>
+          </a:xfrm>
+          <a:prstGeom prst="rect">
+            <a:avLst/>
+          </a:prstGeom>
+          <a:noFill/>
+        </p:spPr>
+        <p:txBody>
+          <a:bodyPr wrap="square">
+            <a:spAutoFit/>
+          </a:bodyPr>
+          <a:lstStyle/>
+          <a:p>
+            <a:pPr algn="ctr"/>
+            <a:r>
+              <a:rPr lang="en-CH" dirty="0"/>
+              <a:t>http://smt-workshop.cs.uiowa.edu/2022/sponsors.shtml</a:t>
+            </a:r>
+          </a:p>
+        </p:txBody>
+      </p:sp>
+      <p:sp>
+        <p:nvSpPr>
+          <p:cNvPr id="10" name="TextBox 9">
+            <a:extLst>
+              <a:ext uri="{FF2B5EF4-FFF2-40B4-BE49-F238E27FC236}">
+                <a16:creationId xmlns:a16="http://schemas.microsoft.com/office/drawing/2014/main" id="{DDBCB3E4-ED75-DE83-D770-1D67504172A2}"/>
+              </a:ext>
+            </a:extLst>
+          </p:cNvPr>
+          <p:cNvSpPr txBox="1"/>
+          <p:nvPr/>
+        </p:nvSpPr>
+        <p:spPr>
+          <a:xfrm>
+            <a:off x="3048000" y="3053133"/>
+            <a:ext cx="6096000" cy="369332"/>
+          </a:xfrm>
+          <a:prstGeom prst="rect">
+            <a:avLst/>
+          </a:prstGeom>
+          <a:noFill/>
+        </p:spPr>
+        <p:txBody>
+          <a:bodyPr wrap="square">
+            <a:spAutoFit/>
+          </a:bodyPr>
+          <a:lstStyle/>
+          <a:p>
+            <a:pPr algn="ctr"/>
+            <a:r>
+              <a:rPr lang="en-CH" dirty="0"/>
+              <a:t>See how our sponsors use SMT in their products!</a:t>
+            </a:r>
+          </a:p>
+        </p:txBody>
+      </p:sp>
+      <p:pic>
+        <p:nvPicPr>
+          <p:cNvPr id="12" name="Picture 11" descr="Qr code&#10;&#10;Description automatically generated">
+            <a:extLst>
+              <a:ext uri="{FF2B5EF4-FFF2-40B4-BE49-F238E27FC236}">
+                <a16:creationId xmlns:a16="http://schemas.microsoft.com/office/drawing/2014/main" id="{6382E34F-2192-3CAF-F967-743A5ED4AFBF}"/>
+              </a:ext>
+            </a:extLst>
+          </p:cNvPr>
+          <p:cNvPicPr>
+            <a:picLocks noChangeAspect="1"/>
+          </p:cNvPicPr>
+          <p:nvPr/>
+        </p:nvPicPr>
+        <p:blipFill>
+          <a:blip r:embed="rId7"/>
+          <a:stretch>
+            <a:fillRect/>
+          </a:stretch>
+        </p:blipFill>
+        <p:spPr>
+          <a:xfrm>
+            <a:off x="4876999" y="4270249"/>
+            <a:ext cx="2438001" cy="2438001"/>
+          </a:xfrm>
+          <a:prstGeom prst="rect">
+            <a:avLst/>
+          </a:prstGeom>
+        </p:spPr>
+      </p:pic>
+    </p:spTree>
+    <p:extLst>
+      <p:ext uri="{BB962C8B-B14F-4D97-AF65-F5344CB8AC3E}">
+        <p14:creationId xmlns:p14="http://schemas.microsoft.com/office/powerpoint/2010/main" val="4145694719"/>
+      </p:ext>
+    </p:extLst>
+  </p:cSld>
+  <p:clrMapOvr>
+    <a:masterClrMapping/>
+  </p:clrMapOvr>
+</p:sld>
+</file>
+
 <file path=ppt/theme/theme1.xml><?xml version="1.0" encoding="utf-8"?>
 <a:theme xmlns:a="http://schemas.openxmlformats.org/drawingml/2006/main" name="Office Theme">
   <a:themeElements>

</xml_diff>